<commit_message>
Add one more small note to slides.
</commit_message>
<xml_diff>
--- a/docs/p4runtime-and-psa-target-specific-types.pptx
+++ b/docs/p4runtime-and-psa-target-specific-types.pptx
@@ -111,6 +111,11 @@
       </a:defRPr>
     </a:lvl9pPr>
   </p:defaultTextStyle>
+  <p:extLst>
+    <p:ext uri="{EFAFB233-063F-42B5-8137-9DF3F51BA10A}">
+      <p15:sldGuideLst xmlns:p15="http://schemas.microsoft.com/office/powerpoint/2012/main"/>
+    </p:ext>
+  </p:extLst>
 </p:presentation>
 </file>
 
@@ -4349,7 +4354,7 @@
         <p:spPr/>
         <p:txBody>
           <a:bodyPr>
-            <a:normAutofit fontScale="85000" lnSpcReduction="20000"/>
+            <a:normAutofit fontScale="77500" lnSpcReduction="20000"/>
           </a:bodyPr>
           <a:lstStyle/>
           <a:p>
@@ -4397,9 +4402,26 @@
             </a:r>
           </a:p>
           <a:p>
-            <a:r>
-              <a:rPr lang="en-US" dirty="0"/>
-              <a:t>What if my myp4prog.p4 tries to add two values of </a:t>
+            <a:pPr lvl="2"/>
+            <a:r>
+              <a:rPr lang="en-US" dirty="0"/>
+              <a:t>Mihai </a:t>
+            </a:r>
+            <a:r>
+              <a:rPr lang="en-US" dirty="0" err="1"/>
+              <a:t>Budiu’s</a:t>
+            </a:r>
+            <a:r>
+              <a:rPr lang="en-US" dirty="0"/>
+              <a:t> suggestion of introducing in P4_16 syntax like “</a:t>
+            </a:r>
+            <a:r>
+              <a:rPr lang="en-US" dirty="0" err="1"/>
+              <a:t>newtype</a:t>
+            </a:r>
+            <a:r>
+              <a:rPr lang="en-US" dirty="0"/>
+              <a:t> bit&lt;7&gt; </a:t>
             </a:r>
             <a:r>
               <a:rPr lang="en-US" dirty="0" err="1"/>
@@ -4407,6 +4429,33 @@
             </a:r>
             <a:r>
               <a:rPr lang="en-US" dirty="0"/>
+              <a:t>” instead of using “</a:t>
+            </a:r>
+            <a:r>
+              <a:rPr lang="en-US" dirty="0" err="1"/>
+              <a:t>typedef</a:t>
+            </a:r>
+            <a:r>
+              <a:rPr lang="en-US" dirty="0"/>
+              <a:t>” may be a </a:t>
+            </a:r>
+            <a:r>
+              <a:rPr lang="en-US"/>
+              <a:t>fruitful approach to take there.</a:t>
+            </a:r>
+            <a:endParaRPr lang="en-US" dirty="0"/>
+          </a:p>
+          <a:p>
+            <a:r>
+              <a:rPr lang="en-US" dirty="0"/>
+              <a:t>What if my myp4prog.p4 tries to add two values of </a:t>
+            </a:r>
+            <a:r>
+              <a:rPr lang="en-US" dirty="0" err="1"/>
+              <a:t>PortId_t</a:t>
+            </a:r>
+            <a:r>
+              <a:rPr lang="en-US" dirty="0"/>
               <a:t>?</a:t>
             </a:r>
           </a:p>
@@ -4421,13 +4470,8 @@
             <a:pPr lvl="1"/>
             <a:r>
               <a:rPr lang="en-US" dirty="0"/>
-              <a:t>Should P4 compilers be _required_ to treat such attempts as errors?  Maybe that would be nice to have.  Beat on that drum, too, if you care strongly enough about it.  The PSA section linked on previous slide already says not to do it, but not everyone reads such things, </a:t>
-            </a:r>
-            <a:r>
-              <a:rPr lang="en-US"/>
-              <a:t>I know.</a:t>
-            </a:r>
-            <a:endParaRPr lang="en-US" dirty="0"/>
+              <a:t>Should P4 compilers be _required_ to treat such attempts as errors?  Maybe that would be nice to have.  Beat on that drum, too, if you care strongly enough about it.  The PSA section linked on previous slide already says not to do it, but not everyone reads such things, I know.</a:t>
+            </a:r>
           </a:p>
         </p:txBody>
       </p:sp>

</xml_diff>

<commit_message>
Add one more open issues slide at end of P4Runtime & PSA slide deck
</commit_message>
<xml_diff>
--- a/docs/p4runtime-and-psa-target-specific-types.pptx
+++ b/docs/p4runtime-and-psa-target-specific-types.pptx
@@ -13,6 +13,7 @@
     <p:sldId id="262" r:id="rId7"/>
     <p:sldId id="263" r:id="rId8"/>
     <p:sldId id="264" r:id="rId9"/>
+    <p:sldId id="265" r:id="rId10"/>
   </p:sldIdLst>
   <p:sldSz cx="12192000" cy="6858000"/>
   <p:notesSz cx="6858000" cy="9144000"/>
@@ -4488,6 +4489,164 @@
 </p:sld>
 </file>
 
+<file path=ppt/slides/slide9.xml><?xml version="1.0" encoding="utf-8"?>
+<p:sld xmlns:a="http://schemas.openxmlformats.org/drawingml/2006/main" xmlns:r="http://schemas.openxmlformats.org/officeDocument/2006/relationships" xmlns:p="http://schemas.openxmlformats.org/presentationml/2006/main">
+  <p:cSld>
+    <p:spTree>
+      <p:nvGrpSpPr>
+        <p:cNvPr id="1" name=""/>
+        <p:cNvGrpSpPr/>
+        <p:nvPr/>
+      </p:nvGrpSpPr>
+      <p:grpSpPr>
+        <a:xfrm>
+          <a:off x="0" y="0"/>
+          <a:ext cx="0" cy="0"/>
+          <a:chOff x="0" y="0"/>
+          <a:chExt cx="0" cy="0"/>
+        </a:xfrm>
+      </p:grpSpPr>
+      <p:sp>
+        <p:nvSpPr>
+          <p:cNvPr id="2" name="Title 1">
+            <a:extLst>
+              <a:ext uri="{FF2B5EF4-FFF2-40B4-BE49-F238E27FC236}">
+                <a16:creationId xmlns:a16="http://schemas.microsoft.com/office/drawing/2014/main" id="{61C08744-3FB5-D448-9733-EB389CFB7253}"/>
+              </a:ext>
+            </a:extLst>
+          </p:cNvPr>
+          <p:cNvSpPr>
+            <a:spLocks noGrp="1"/>
+          </p:cNvSpPr>
+          <p:nvPr>
+            <p:ph type="title"/>
+          </p:nvPr>
+        </p:nvSpPr>
+        <p:spPr/>
+        <p:txBody>
+          <a:bodyPr/>
+          <a:lstStyle/>
+          <a:p>
+            <a:r>
+              <a:rPr lang="en-US" dirty="0"/>
+              <a:t>Open issues (2)</a:t>
+            </a:r>
+          </a:p>
+        </p:txBody>
+      </p:sp>
+      <p:sp>
+        <p:nvSpPr>
+          <p:cNvPr id="3" name="Content Placeholder 2">
+            <a:extLst>
+              <a:ext uri="{FF2B5EF4-FFF2-40B4-BE49-F238E27FC236}">
+                <a16:creationId xmlns:a16="http://schemas.microsoft.com/office/drawing/2014/main" id="{9639C560-520B-8341-8F84-C7D6921959C6}"/>
+              </a:ext>
+            </a:extLst>
+          </p:cNvPr>
+          <p:cNvSpPr>
+            <a:spLocks noGrp="1"/>
+          </p:cNvSpPr>
+          <p:nvPr>
+            <p:ph idx="1"/>
+          </p:nvPr>
+        </p:nvSpPr>
+        <p:spPr/>
+        <p:txBody>
+          <a:bodyPr/>
+          <a:lstStyle/>
+          <a:p>
+            <a:r>
+              <a:rPr lang="en-US" dirty="0"/>
+              <a:t>Should controller software be able to name PSA_PORT_CPU and PSA_PORT_RECIRCULATE values in target-independent way?</a:t>
+            </a:r>
+          </a:p>
+          <a:p>
+            <a:pPr lvl="1"/>
+            <a:r>
+              <a:rPr lang="en-US" dirty="0"/>
+              <a:t>Seems useful.  Seems like there should be a straightforward way to do this.</a:t>
+            </a:r>
+          </a:p>
+          <a:p>
+            <a:r>
+              <a:rPr lang="en-US" dirty="0"/>
+              <a:t>Potential quick hack:</a:t>
+            </a:r>
+          </a:p>
+          <a:p>
+            <a:pPr lvl="1"/>
+            <a:r>
+              <a:rPr lang="en-US" dirty="0"/>
+              <a:t>To generate P4Info file, compile with a psa.p4 file that has “</a:t>
+            </a:r>
+            <a:r>
+              <a:rPr lang="en-US" dirty="0" err="1"/>
+              <a:t>typedef</a:t>
+            </a:r>
+            <a:r>
+              <a:rPr lang="en-US" dirty="0"/>
+              <a:t> bit&lt;16&gt; </a:t>
+            </a:r>
+            <a:r>
+              <a:rPr lang="en-US" dirty="0" err="1"/>
+              <a:t>PortId_t</a:t>
+            </a:r>
+            <a:r>
+              <a:rPr lang="en-US" dirty="0"/>
+              <a:t>;”, the size in bits that you want </a:t>
+            </a:r>
+            <a:r>
+              <a:rPr lang="en-US" dirty="0" err="1"/>
+              <a:t>PortId_t</a:t>
+            </a:r>
+            <a:r>
+              <a:rPr lang="en-US" dirty="0"/>
+              <a:t> values to be between controllers/clients and agents/servers.</a:t>
+            </a:r>
+          </a:p>
+          <a:p>
+            <a:pPr lvl="1"/>
+            <a:r>
+              <a:rPr lang="en-US" dirty="0"/>
+              <a:t>I do not think this is a good log term approach, because for the 2 PSA types with numerical translation, </a:t>
+            </a:r>
+            <a:r>
+              <a:rPr lang="en-US" dirty="0" err="1"/>
+              <a:t>PortId_t</a:t>
+            </a:r>
+            <a:r>
+              <a:rPr lang="en-US" dirty="0"/>
+              <a:t> and </a:t>
+            </a:r>
+            <a:r>
+              <a:rPr lang="en-US" dirty="0" err="1"/>
+              <a:t>ClassOfService_t</a:t>
+            </a:r>
+            <a:r>
+              <a:rPr lang="en-US" dirty="0"/>
+              <a:t>, we still want to minimize annotations in P4 program myp4prog.p4 wherever those types are used</a:t>
+            </a:r>
+            <a:r>
+              <a:rPr lang="en-US"/>
+              <a:t>, ideally 0 of them.</a:t>
+            </a:r>
+            <a:endParaRPr lang="en-US" dirty="0"/>
+          </a:p>
+        </p:txBody>
+      </p:sp>
+    </p:spTree>
+    <p:extLst>
+      <p:ext uri="{BB962C8B-B14F-4D97-AF65-F5344CB8AC3E}">
+        <p14:creationId xmlns:p14="http://schemas.microsoft.com/office/powerpoint/2010/main" val="977021181"/>
+      </p:ext>
+    </p:extLst>
+  </p:cSld>
+  <p:clrMapOvr>
+    <a:masterClrMapping/>
+  </p:clrMapOvr>
+</p:sld>
+</file>
+
 <file path=ppt/theme/theme1.xml><?xml version="1.0" encoding="utf-8"?>
 <a:theme xmlns:a="http://schemas.openxmlformats.org/drawingml/2006/main" name="Office Theme">
   <a:themeElements>

</xml_diff>

<commit_message>
Some more small edits to P4Runtime and PSA 'control plane types' slides
including a couple at the end summarizing the approach we plan to use.
</commit_message>
<xml_diff>
--- a/docs/p4runtime-and-psa-target-specific-types.pptx
+++ b/docs/p4runtime-and-psa-target-specific-types.pptx
@@ -21,6 +21,9 @@
     <p:sldId id="272" r:id="rId15"/>
     <p:sldId id="270" r:id="rId16"/>
     <p:sldId id="271" r:id="rId17"/>
+    <p:sldId id="273" r:id="rId18"/>
+    <p:sldId id="274" r:id="rId19"/>
+    <p:sldId id="276" r:id="rId20"/>
   </p:sldIdLst>
   <p:sldSz cx="12192000" cy="6858000"/>
   <p:notesSz cx="6858000" cy="9144000"/>
@@ -274,7 +277,7 @@
           <a:p>
             <a:fld id="{5B989F93-802E-9345-8A26-91F58232E6D2}" type="datetimeFigureOut">
               <a:rPr lang="en-US" smtClean="0"/>
-              <a:t>4/19/18</a:t>
+              <a:t>5/16/18</a:t>
             </a:fld>
             <a:endParaRPr lang="en-US"/>
           </a:p>
@@ -472,7 +475,7 @@
           <a:p>
             <a:fld id="{5B989F93-802E-9345-8A26-91F58232E6D2}" type="datetimeFigureOut">
               <a:rPr lang="en-US" smtClean="0"/>
-              <a:t>4/19/18</a:t>
+              <a:t>5/16/18</a:t>
             </a:fld>
             <a:endParaRPr lang="en-US"/>
           </a:p>
@@ -680,7 +683,7 @@
           <a:p>
             <a:fld id="{5B989F93-802E-9345-8A26-91F58232E6D2}" type="datetimeFigureOut">
               <a:rPr lang="en-US" smtClean="0"/>
-              <a:t>4/19/18</a:t>
+              <a:t>5/16/18</a:t>
             </a:fld>
             <a:endParaRPr lang="en-US"/>
           </a:p>
@@ -878,7 +881,7 @@
           <a:p>
             <a:fld id="{5B989F93-802E-9345-8A26-91F58232E6D2}" type="datetimeFigureOut">
               <a:rPr lang="en-US" smtClean="0"/>
-              <a:t>4/19/18</a:t>
+              <a:t>5/16/18</a:t>
             </a:fld>
             <a:endParaRPr lang="en-US"/>
           </a:p>
@@ -1153,7 +1156,7 @@
           <a:p>
             <a:fld id="{5B989F93-802E-9345-8A26-91F58232E6D2}" type="datetimeFigureOut">
               <a:rPr lang="en-US" smtClean="0"/>
-              <a:t>4/19/18</a:t>
+              <a:t>5/16/18</a:t>
             </a:fld>
             <a:endParaRPr lang="en-US"/>
           </a:p>
@@ -1418,7 +1421,7 @@
           <a:p>
             <a:fld id="{5B989F93-802E-9345-8A26-91F58232E6D2}" type="datetimeFigureOut">
               <a:rPr lang="en-US" smtClean="0"/>
-              <a:t>4/19/18</a:t>
+              <a:t>5/16/18</a:t>
             </a:fld>
             <a:endParaRPr lang="en-US"/>
           </a:p>
@@ -1830,7 +1833,7 @@
           <a:p>
             <a:fld id="{5B989F93-802E-9345-8A26-91F58232E6D2}" type="datetimeFigureOut">
               <a:rPr lang="en-US" smtClean="0"/>
-              <a:t>4/19/18</a:t>
+              <a:t>5/16/18</a:t>
             </a:fld>
             <a:endParaRPr lang="en-US"/>
           </a:p>
@@ -1971,7 +1974,7 @@
           <a:p>
             <a:fld id="{5B989F93-802E-9345-8A26-91F58232E6D2}" type="datetimeFigureOut">
               <a:rPr lang="en-US" smtClean="0"/>
-              <a:t>4/19/18</a:t>
+              <a:t>5/16/18</a:t>
             </a:fld>
             <a:endParaRPr lang="en-US"/>
           </a:p>
@@ -2084,7 +2087,7 @@
           <a:p>
             <a:fld id="{5B989F93-802E-9345-8A26-91F58232E6D2}" type="datetimeFigureOut">
               <a:rPr lang="en-US" smtClean="0"/>
-              <a:t>4/19/18</a:t>
+              <a:t>5/16/18</a:t>
             </a:fld>
             <a:endParaRPr lang="en-US"/>
           </a:p>
@@ -2395,7 +2398,7 @@
           <a:p>
             <a:fld id="{5B989F93-802E-9345-8A26-91F58232E6D2}" type="datetimeFigureOut">
               <a:rPr lang="en-US" smtClean="0"/>
-              <a:t>4/19/18</a:t>
+              <a:t>5/16/18</a:t>
             </a:fld>
             <a:endParaRPr lang="en-US"/>
           </a:p>
@@ -2683,7 +2686,7 @@
           <a:p>
             <a:fld id="{5B989F93-802E-9345-8A26-91F58232E6D2}" type="datetimeFigureOut">
               <a:rPr lang="en-US" smtClean="0"/>
-              <a:t>4/19/18</a:t>
+              <a:t>5/16/18</a:t>
             </a:fld>
             <a:endParaRPr lang="en-US"/>
           </a:p>
@@ -2924,7 +2927,7 @@
           <a:p>
             <a:fld id="{5B989F93-802E-9345-8A26-91F58232E6D2}" type="datetimeFigureOut">
               <a:rPr lang="en-US" smtClean="0"/>
-              <a:t>4/19/18</a:t>
+              <a:t>5/16/18</a:t>
             </a:fld>
             <a:endParaRPr lang="en-US"/>
           </a:p>
@@ -3403,7 +3406,7 @@
           <a:p>
             <a:r>
               <a:rPr lang="en-US" dirty="0"/>
-              <a:t>This version last updated: April 8, 2018</a:t>
+              <a:t>This version last updated: May 16, 2018</a:t>
             </a:r>
           </a:p>
           <a:p>
@@ -4045,13 +4048,8 @@
           <a:p>
             <a:r>
               <a:rPr lang="en-US" dirty="0"/>
-              <a:t>Currently p4c uses the names in the list expression to generate P4Info, disallowing expressions </a:t>
-            </a:r>
-            <a:r>
-              <a:rPr lang="en-US"/>
-              <a:t>or constants.</a:t>
-            </a:r>
-            <a:endParaRPr lang="en-US" dirty="0"/>
+              <a:t>Currently p4c uses the names in the list expression to generate P4Info, disallowing expressions or constants.</a:t>
+            </a:r>
           </a:p>
         </p:txBody>
       </p:sp>
@@ -4387,7 +4385,7 @@
         <p:spPr/>
         <p:txBody>
           <a:bodyPr>
-            <a:normAutofit fontScale="77500" lnSpcReduction="20000"/>
+            <a:normAutofit fontScale="70000" lnSpcReduction="20000"/>
           </a:bodyPr>
           <a:lstStyle/>
           <a:p>
@@ -4615,6 +4613,53 @@
             </a:r>
           </a:p>
           <a:p>
+            <a:pPr lvl="2"/>
+            <a:r>
+              <a:rPr lang="en-US" dirty="0"/>
+              <a:t>(</a:t>
+            </a:r>
+            <a:r>
+              <a:rPr lang="en-US" dirty="0" err="1"/>
+              <a:t>my_port</a:t>
+            </a:r>
+            <a:r>
+              <a:rPr lang="en-US" dirty="0"/>
+              <a:t> == (</a:t>
+            </a:r>
+            <a:r>
+              <a:rPr lang="en-US" dirty="0" err="1"/>
+              <a:t>PortId_t</a:t>
+            </a:r>
+            <a:r>
+              <a:rPr lang="en-US" dirty="0"/>
+              <a:t>) 1) would be not a compiler error, but maybe a lint tool warning.</a:t>
+            </a:r>
+          </a:p>
+          <a:p>
+            <a:pPr lvl="2"/>
+            <a:r>
+              <a:rPr lang="en-US" dirty="0"/>
+              <a:t>Should there be a “</a:t>
+            </a:r>
+            <a:r>
+              <a:rPr lang="en-US" dirty="0" err="1"/>
+              <a:t>PortIdBaseType_t</a:t>
+            </a:r>
+            <a:r>
+              <a:rPr lang="en-US" dirty="0"/>
+              <a:t>” cast auto-created from ”</a:t>
+            </a:r>
+            <a:r>
+              <a:rPr lang="en-US" dirty="0" err="1"/>
+              <a:t>newtype</a:t>
+            </a:r>
+            <a:r>
+              <a:rPr lang="en-US"/>
+              <a:t>” definition.</a:t>
+            </a:r>
+            <a:endParaRPr lang="en-US" dirty="0"/>
+          </a:p>
+          <a:p>
             <a:pPr lvl="1"/>
             <a:r>
               <a:rPr lang="en-US" dirty="0"/>
@@ -4626,6 +4671,28 @@
             <a:r>
               <a:rPr lang="en-US" dirty="0"/>
               <a:t>The compiler can’t stop you from writing functional errors in all cases.  I don’t think anyone should reasonably expect a compiler to catch all possible functional errors (or even many of them).</a:t>
+            </a:r>
+          </a:p>
+          <a:p>
+            <a:r>
+              <a:rPr lang="en-US" dirty="0"/>
+              <a:t>These ideas align well with the “</a:t>
+            </a:r>
+            <a:r>
+              <a:rPr lang="en-US" dirty="0" err="1"/>
+              <a:t>newtype</a:t>
+            </a:r>
+            <a:r>
+              <a:rPr lang="en-US" dirty="0"/>
+              <a:t> bit&lt;7&gt; </a:t>
+            </a:r>
+            <a:r>
+              <a:rPr lang="en-US" dirty="0" err="1"/>
+              <a:t>PortId_t</a:t>
+            </a:r>
+            <a:r>
+              <a:rPr lang="en-US" dirty="0"/>
+              <a:t>;” proposal.</a:t>
             </a:r>
           </a:p>
         </p:txBody>
@@ -4803,15 +4870,7 @@
             </a:r>
             <a:r>
               <a:rPr lang="en-US" dirty="0"/>
-              <a:t>&gt; </a:t>
-            </a:r>
-            <a:r>
-              <a:rPr lang="en-US" dirty="0" err="1"/>
-              <a:t>bix</a:t>
-            </a:r>
-            <a:r>
-              <a:rPr lang="en-US" dirty="0"/>
-              <a:t>&lt;X&gt; value) be?</a:t>
+              <a:t>&gt; bit&lt;X&gt; value) be?</a:t>
             </a:r>
           </a:p>
           <a:p>
@@ -4888,6 +4947,1117 @@
     <p:extLst>
       <p:ext uri="{BB962C8B-B14F-4D97-AF65-F5344CB8AC3E}">
         <p14:creationId xmlns:p14="http://schemas.microsoft.com/office/powerpoint/2010/main" val="3466415511"/>
+      </p:ext>
+    </p:extLst>
+  </p:cSld>
+  <p:clrMapOvr>
+    <a:masterClrMapping/>
+  </p:clrMapOvr>
+</p:sld>
+</file>
+
+<file path=ppt/slides/slide17.xml><?xml version="1.0" encoding="utf-8"?>
+<p:sld xmlns:a="http://schemas.openxmlformats.org/drawingml/2006/main" xmlns:r="http://schemas.openxmlformats.org/officeDocument/2006/relationships" xmlns:p="http://schemas.openxmlformats.org/presentationml/2006/main">
+  <p:cSld>
+    <p:spTree>
+      <p:nvGrpSpPr>
+        <p:cNvPr id="1" name=""/>
+        <p:cNvGrpSpPr/>
+        <p:nvPr/>
+      </p:nvGrpSpPr>
+      <p:grpSpPr>
+        <a:xfrm>
+          <a:off x="0" y="0"/>
+          <a:ext cx="0" cy="0"/>
+          <a:chOff x="0" y="0"/>
+          <a:chExt cx="0" cy="0"/>
+        </a:xfrm>
+      </p:grpSpPr>
+      <p:sp>
+        <p:nvSpPr>
+          <p:cNvPr id="2" name="Title 1">
+            <a:extLst>
+              <a:ext uri="{FF2B5EF4-FFF2-40B4-BE49-F238E27FC236}">
+                <a16:creationId xmlns:a16="http://schemas.microsoft.com/office/drawing/2014/main" id="{CF014429-7CBF-5842-A22C-2DD6A06F8EEA}"/>
+              </a:ext>
+            </a:extLst>
+          </p:cNvPr>
+          <p:cNvSpPr>
+            <a:spLocks noGrp="1"/>
+          </p:cNvSpPr>
+          <p:nvPr>
+            <p:ph type="title"/>
+          </p:nvPr>
+        </p:nvSpPr>
+        <p:spPr/>
+        <p:txBody>
+          <a:bodyPr/>
+          <a:lstStyle/>
+          <a:p>
+            <a:r>
+              <a:rPr lang="en-US" dirty="0"/>
+              <a:t>Categories of control plane types</a:t>
+            </a:r>
+            <a:br>
+              <a:rPr lang="en-US" dirty="0"/>
+            </a:br>
+            <a:endParaRPr lang="en-US" dirty="0"/>
+          </a:p>
+        </p:txBody>
+      </p:sp>
+      <p:graphicFrame>
+        <p:nvGraphicFramePr>
+          <p:cNvPr id="4" name="Content Placeholder 3">
+            <a:extLst>
+              <a:ext uri="{FF2B5EF4-FFF2-40B4-BE49-F238E27FC236}">
+                <a16:creationId xmlns:a16="http://schemas.microsoft.com/office/drawing/2014/main" id="{34B6FA22-3462-4645-AAE1-09A7E2FC434E}"/>
+              </a:ext>
+            </a:extLst>
+          </p:cNvPr>
+          <p:cNvGraphicFramePr>
+            <a:graphicFrameLocks noGrp="1"/>
+          </p:cNvGraphicFramePr>
+          <p:nvPr>
+            <p:ph idx="1"/>
+            <p:extLst>
+              <p:ext uri="{D42A27DB-BD31-4B8C-83A1-F6EECF244321}">
+                <p14:modId xmlns:p14="http://schemas.microsoft.com/office/powerpoint/2010/main" val="1247468738"/>
+              </p:ext>
+            </p:extLst>
+          </p:nvPr>
+        </p:nvGraphicFramePr>
+        <p:xfrm>
+          <a:off x="708368" y="1027906"/>
+          <a:ext cx="10297888" cy="5826760"/>
+        </p:xfrm>
+        <a:graphic>
+          <a:graphicData uri="http://schemas.openxmlformats.org/drawingml/2006/table">
+            <a:tbl>
+              <a:tblPr firstRow="1" bandRow="1">
+                <a:tableStyleId>{5C22544A-7EE6-4342-B048-85BDC9FD1C3A}</a:tableStyleId>
+              </a:tblPr>
+              <a:tblGrid>
+                <a:gridCol w="2574472">
+                  <a:extLst>
+                    <a:ext uri="{9D8B030D-6E8A-4147-A177-3AD203B41FA5}">
+                      <a16:colId xmlns:a16="http://schemas.microsoft.com/office/drawing/2014/main" val="4020416937"/>
+                    </a:ext>
+                  </a:extLst>
+                </a:gridCol>
+                <a:gridCol w="1779814">
+                  <a:extLst>
+                    <a:ext uri="{9D8B030D-6E8A-4147-A177-3AD203B41FA5}">
+                      <a16:colId xmlns:a16="http://schemas.microsoft.com/office/drawing/2014/main" val="2118309607"/>
+                    </a:ext>
+                  </a:extLst>
+                </a:gridCol>
+                <a:gridCol w="2832409">
+                  <a:extLst>
+                    <a:ext uri="{9D8B030D-6E8A-4147-A177-3AD203B41FA5}">
+                      <a16:colId xmlns:a16="http://schemas.microsoft.com/office/drawing/2014/main" val="1706010005"/>
+                    </a:ext>
+                  </a:extLst>
+                </a:gridCol>
+                <a:gridCol w="3111193">
+                  <a:extLst>
+                    <a:ext uri="{9D8B030D-6E8A-4147-A177-3AD203B41FA5}">
+                      <a16:colId xmlns:a16="http://schemas.microsoft.com/office/drawing/2014/main" val="3410714799"/>
+                    </a:ext>
+                  </a:extLst>
+                </a:gridCol>
+              </a:tblGrid>
+              <a:tr h="370840">
+                <a:tc>
+                  <a:txBody>
+                    <a:bodyPr/>
+                    <a:lstStyle/>
+                    <a:p>
+                      <a:endParaRPr lang="en-US" sz="1400" baseline="0" dirty="0"/>
+                    </a:p>
+                  </a:txBody>
+                  <a:tcPr/>
+                </a:tc>
+                <a:tc>
+                  <a:txBody>
+                    <a:bodyPr/>
+                    <a:lstStyle/>
+                    <a:p>
+                      <a:r>
+                        <a:rPr lang="en-US" sz="1400" baseline="0" dirty="0"/>
+                        <a:t>Data and control plane sizes identical.  Control plane may use custom syntax for input/output (e.g. IPv4Address_t)</a:t>
+                      </a:r>
+                    </a:p>
+                  </a:txBody>
+                  <a:tcPr/>
+                </a:tc>
+                <a:tc>
+                  <a:txBody>
+                    <a:bodyPr/>
+                    <a:lstStyle/>
+                    <a:p>
+                      <a:r>
+                        <a:rPr lang="en-US" sz="1400" baseline="0" dirty="0"/>
+                        <a:t>Per-target custom data plane size, but no numerical translation (e.g. </a:t>
+                      </a:r>
+                      <a:r>
+                        <a:rPr lang="en-US" sz="1400" baseline="0" dirty="0" err="1"/>
+                        <a:t>MulticastGroup_t</a:t>
+                      </a:r>
+                      <a:r>
+                        <a:rPr lang="en-US" sz="1400" baseline="0" dirty="0"/>
+                        <a:t>, </a:t>
+                      </a:r>
+                      <a:r>
+                        <a:rPr lang="en-US" sz="1400" baseline="0" dirty="0" err="1"/>
+                        <a:t>CloneSessionId_t</a:t>
+                      </a:r>
+                      <a:r>
+                        <a:rPr lang="en-US" sz="1400" baseline="0" dirty="0"/>
+                        <a:t>, </a:t>
+                      </a:r>
+                      <a:r>
+                        <a:rPr lang="en-US" sz="1400" baseline="0" dirty="0" err="1"/>
+                        <a:t>PacketLength_t</a:t>
+                      </a:r>
+                      <a:r>
+                        <a:rPr lang="en-US" sz="1400" baseline="0" dirty="0"/>
+                        <a:t>, </a:t>
+                      </a:r>
+                      <a:r>
+                        <a:rPr lang="en-US" sz="1400" baseline="0" dirty="0" err="1"/>
+                        <a:t>EgressInstance_t</a:t>
+                      </a:r>
+                      <a:r>
+                        <a:rPr lang="en-US" sz="1400" baseline="0" dirty="0"/>
+                        <a:t>)</a:t>
+                      </a:r>
+                    </a:p>
+                  </a:txBody>
+                  <a:tcPr/>
+                </a:tc>
+                <a:tc>
+                  <a:txBody>
+                    <a:bodyPr/>
+                    <a:lstStyle/>
+                    <a:p>
+                      <a:r>
+                        <a:rPr lang="en-US" sz="1400" baseline="0" dirty="0"/>
+                        <a:t>Per-target custom data plane size, and numerical translation between control and data planes (e.g. </a:t>
+                      </a:r>
+                      <a:r>
+                        <a:rPr lang="en-US" sz="1400" baseline="0" dirty="0" err="1"/>
+                        <a:t>PortId_t</a:t>
+                      </a:r>
+                      <a:r>
+                        <a:rPr lang="en-US" sz="1400" baseline="0" dirty="0"/>
+                        <a:t>, </a:t>
+                      </a:r>
+                      <a:r>
+                        <a:rPr lang="en-US" sz="1400" baseline="0" dirty="0" err="1"/>
+                        <a:t>ClassOfService_t</a:t>
+                      </a:r>
+                      <a:r>
+                        <a:rPr lang="en-US" sz="1400" baseline="0" dirty="0"/>
+                        <a:t>, </a:t>
+                      </a:r>
+                      <a:r>
+                        <a:rPr lang="en-US" sz="1400" baseline="0" dirty="0" err="1"/>
+                        <a:t>Timestamp_t</a:t>
+                      </a:r>
+                      <a:r>
+                        <a:rPr lang="en-US" sz="1400" baseline="0" dirty="0"/>
+                        <a:t>)</a:t>
+                      </a:r>
+                    </a:p>
+                  </a:txBody>
+                  <a:tcPr/>
+                </a:tc>
+                <a:extLst>
+                  <a:ext uri="{0D108BD9-81ED-4DB2-BD59-A6C34878D82A}">
+                    <a16:rowId xmlns:a16="http://schemas.microsoft.com/office/drawing/2014/main" val="4207647408"/>
+                  </a:ext>
+                </a:extLst>
+              </a:tr>
+              <a:tr h="370840">
+                <a:tc>
+                  <a:txBody>
+                    <a:bodyPr/>
+                    <a:lstStyle/>
+                    <a:p>
+                      <a:r>
+                        <a:rPr lang="en-US" sz="1400" baseline="0" dirty="0"/>
+                        <a:t>Numerical translation in agent?</a:t>
+                      </a:r>
+                    </a:p>
+                  </a:txBody>
+                  <a:tcPr/>
+                </a:tc>
+                <a:tc>
+                  <a:txBody>
+                    <a:bodyPr/>
+                    <a:lstStyle/>
+                    <a:p>
+                      <a:r>
+                        <a:rPr lang="en-US" sz="1400" baseline="0" dirty="0"/>
+                        <a:t>No</a:t>
+                      </a:r>
+                    </a:p>
+                  </a:txBody>
+                  <a:tcPr/>
+                </a:tc>
+                <a:tc>
+                  <a:txBody>
+                    <a:bodyPr/>
+                    <a:lstStyle/>
+                    <a:p>
+                      <a:r>
+                        <a:rPr lang="en-US" sz="1400" baseline="0" dirty="0"/>
+                        <a:t>No</a:t>
+                      </a:r>
+                    </a:p>
+                  </a:txBody>
+                  <a:tcPr/>
+                </a:tc>
+                <a:tc>
+                  <a:txBody>
+                    <a:bodyPr/>
+                    <a:lstStyle/>
+                    <a:p>
+                      <a:r>
+                        <a:rPr lang="en-US" sz="1400" baseline="0" dirty="0"/>
+                        <a:t>Yes</a:t>
+                      </a:r>
+                    </a:p>
+                  </a:txBody>
+                  <a:tcPr/>
+                </a:tc>
+                <a:extLst>
+                  <a:ext uri="{0D108BD9-81ED-4DB2-BD59-A6C34878D82A}">
+                    <a16:rowId xmlns:a16="http://schemas.microsoft.com/office/drawing/2014/main" val="3623559023"/>
+                  </a:ext>
+                </a:extLst>
+              </a:tr>
+              <a:tr h="370840">
+                <a:tc>
+                  <a:txBody>
+                    <a:bodyPr/>
+                    <a:lstStyle/>
+                    <a:p>
+                      <a:r>
+                        <a:rPr lang="en-US" sz="1400" baseline="0" dirty="0"/>
+                        <a:t>Data plane size in bits can be different than control plane size?</a:t>
+                      </a:r>
+                    </a:p>
+                  </a:txBody>
+                  <a:tcPr/>
+                </a:tc>
+                <a:tc>
+                  <a:txBody>
+                    <a:bodyPr/>
+                    <a:lstStyle/>
+                    <a:p>
+                      <a:r>
+                        <a:rPr lang="en-US" sz="1400" baseline="0" dirty="0"/>
+                        <a:t>No</a:t>
+                      </a:r>
+                    </a:p>
+                  </a:txBody>
+                  <a:tcPr/>
+                </a:tc>
+                <a:tc>
+                  <a:txBody>
+                    <a:bodyPr/>
+                    <a:lstStyle/>
+                    <a:p>
+                      <a:r>
+                        <a:rPr lang="en-US" sz="1400" baseline="0" dirty="0"/>
+                        <a:t>Yes</a:t>
+                      </a:r>
+                    </a:p>
+                  </a:txBody>
+                  <a:tcPr/>
+                </a:tc>
+                <a:tc>
+                  <a:txBody>
+                    <a:bodyPr/>
+                    <a:lstStyle/>
+                    <a:p>
+                      <a:r>
+                        <a:rPr lang="en-US" sz="1400" baseline="0" dirty="0"/>
+                        <a:t>Yes</a:t>
+                      </a:r>
+                    </a:p>
+                  </a:txBody>
+                  <a:tcPr/>
+                </a:tc>
+                <a:extLst>
+                  <a:ext uri="{0D108BD9-81ED-4DB2-BD59-A6C34878D82A}">
+                    <a16:rowId xmlns:a16="http://schemas.microsoft.com/office/drawing/2014/main" val="247764123"/>
+                  </a:ext>
+                </a:extLst>
+              </a:tr>
+              <a:tr h="370840">
+                <a:tc>
+                  <a:txBody>
+                    <a:bodyPr/>
+                    <a:lstStyle/>
+                    <a:p>
+                      <a:r>
+                        <a:rPr lang="en-US" sz="1400" baseline="0" dirty="0"/>
+                        <a:t>Agent should check and return error if controller value is invalid?</a:t>
+                      </a:r>
+                    </a:p>
+                  </a:txBody>
+                  <a:tcPr/>
+                </a:tc>
+                <a:tc>
+                  <a:txBody>
+                    <a:bodyPr/>
+                    <a:lstStyle/>
+                    <a:p>
+                      <a:r>
+                        <a:rPr lang="en-US" sz="1400" baseline="0" dirty="0"/>
+                        <a:t>No – all possible values for the type should be considered OK by the agent.</a:t>
+                      </a:r>
+                    </a:p>
+                  </a:txBody>
+                  <a:tcPr/>
+                </a:tc>
+                <a:tc>
+                  <a:txBody>
+                    <a:bodyPr/>
+                    <a:lstStyle/>
+                    <a:p>
+                      <a:r>
+                        <a:rPr lang="en-US" sz="1400" baseline="0" dirty="0"/>
+                        <a:t>Yes – </a:t>
+                      </a:r>
+                      <a:r>
+                        <a:rPr lang="en-US" sz="1400" baseline="0" dirty="0" err="1"/>
+                        <a:t>MulticastGroup_t</a:t>
+                      </a:r>
+                      <a:r>
+                        <a:rPr lang="en-US" sz="1400" baseline="0" dirty="0"/>
+                        <a:t> might have a range of valid values that is not a power of 2, e.g. [0, 12K-1].  A controller attempting to use 12K+5 should give error.</a:t>
+                      </a:r>
+                    </a:p>
+                  </a:txBody>
+                  <a:tcPr/>
+                </a:tc>
+                <a:tc>
+                  <a:txBody>
+                    <a:bodyPr/>
+                    <a:lstStyle/>
+                    <a:p>
+                      <a:r>
+                        <a:rPr lang="en-US" sz="1400" baseline="0" dirty="0"/>
+                        <a:t>Yes – Valid 32-bit </a:t>
+                      </a:r>
+                      <a:r>
+                        <a:rPr lang="en-US" sz="1400" baseline="0" dirty="0" err="1"/>
+                        <a:t>PortId_t</a:t>
+                      </a:r>
+                      <a:r>
+                        <a:rPr lang="en-US" sz="1400" baseline="0"/>
+                        <a:t> values </a:t>
+                      </a:r>
+                      <a:r>
+                        <a:rPr lang="en-US" sz="1400" baseline="0" dirty="0"/>
+                        <a:t>in control plane might be arbitrary subset of possible bit patterns, and agent should return error if controller attempts to use unsupported value.</a:t>
+                      </a:r>
+                    </a:p>
+                  </a:txBody>
+                  <a:tcPr/>
+                </a:tc>
+                <a:extLst>
+                  <a:ext uri="{0D108BD9-81ED-4DB2-BD59-A6C34878D82A}">
+                    <a16:rowId xmlns:a16="http://schemas.microsoft.com/office/drawing/2014/main" val="1749571212"/>
+                  </a:ext>
+                </a:extLst>
+              </a:tr>
+              <a:tr h="370840">
+                <a:tc>
+                  <a:txBody>
+                    <a:bodyPr/>
+                    <a:lstStyle/>
+                    <a:p>
+                      <a:r>
+                        <a:rPr lang="en-US" sz="1400" baseline="0" dirty="0"/>
+                        <a:t>Useful to do arithmetic on values in data plane?</a:t>
+                      </a:r>
+                    </a:p>
+                  </a:txBody>
+                  <a:tcPr/>
+                </a:tc>
+                <a:tc>
+                  <a:txBody>
+                    <a:bodyPr/>
+                    <a:lstStyle/>
+                    <a:p>
+                      <a:r>
+                        <a:rPr lang="en-US" sz="1400" baseline="0" dirty="0"/>
+                        <a:t>Yes</a:t>
+                      </a:r>
+                    </a:p>
+                  </a:txBody>
+                  <a:tcPr/>
+                </a:tc>
+                <a:tc>
+                  <a:txBody>
+                    <a:bodyPr/>
+                    <a:lstStyle/>
+                    <a:p>
+                      <a:r>
+                        <a:rPr lang="en-US" sz="1400" baseline="0" dirty="0"/>
+                        <a:t>Yes, addition, subtraction, &lt; &lt;= &gt; &gt;= for </a:t>
+                      </a:r>
+                      <a:r>
+                        <a:rPr lang="en-US" sz="1400" baseline="0" dirty="0" err="1"/>
+                        <a:t>PacketLength_t</a:t>
+                      </a:r>
+                      <a:r>
+                        <a:rPr lang="en-US" sz="1400" baseline="0" dirty="0"/>
+                        <a:t>.  Less clear how useful for other types.</a:t>
+                      </a:r>
+                    </a:p>
+                  </a:txBody>
+                  <a:tcPr/>
+                </a:tc>
+                <a:tc>
+                  <a:txBody>
+                    <a:bodyPr/>
+                    <a:lstStyle/>
+                    <a:p>
+                      <a:r>
+                        <a:rPr lang="en-US" sz="1400" baseline="0" dirty="0"/>
+                        <a:t>Maybe in a few unusual circumstances</a:t>
+                      </a:r>
+                    </a:p>
+                  </a:txBody>
+                  <a:tcPr/>
+                </a:tc>
+                <a:extLst>
+                  <a:ext uri="{0D108BD9-81ED-4DB2-BD59-A6C34878D82A}">
+                    <a16:rowId xmlns:a16="http://schemas.microsoft.com/office/drawing/2014/main" val="2529723695"/>
+                  </a:ext>
+                </a:extLst>
+              </a:tr>
+              <a:tr h="370840">
+                <a:tc>
+                  <a:txBody>
+                    <a:bodyPr/>
+                    <a:lstStyle/>
+                    <a:p>
+                      <a:r>
+                        <a:rPr lang="en-US" sz="1400" baseline="0" dirty="0"/>
+                        <a:t>Useful to do binary operations with bit&lt;W&gt; types of same width?</a:t>
+                      </a:r>
+                    </a:p>
+                  </a:txBody>
+                  <a:tcPr/>
+                </a:tc>
+                <a:tc>
+                  <a:txBody>
+                    <a:bodyPr/>
+                    <a:lstStyle/>
+                    <a:p>
+                      <a:r>
+                        <a:rPr lang="en-US" sz="1400" baseline="0" dirty="0"/>
+                        <a:t>Yes, e.g. bitwise AND with constant or run-time variable masks.</a:t>
+                      </a:r>
+                    </a:p>
+                  </a:txBody>
+                  <a:tcPr/>
+                </a:tc>
+                <a:tc>
+                  <a:txBody>
+                    <a:bodyPr/>
+                    <a:lstStyle/>
+                    <a:p>
+                      <a:r>
+                        <a:rPr lang="en-US" sz="1400" baseline="0" dirty="0"/>
+                        <a:t>Yes, add/subtract constant for calculating new packet lengths when adding/removing headers.</a:t>
+                      </a:r>
+                    </a:p>
+                  </a:txBody>
+                  <a:tcPr/>
+                </a:tc>
+                <a:tc>
+                  <a:txBody>
+                    <a:bodyPr/>
+                    <a:lstStyle/>
+                    <a:p>
+                      <a:r>
+                        <a:rPr lang="en-US" sz="1400" baseline="0" dirty="0"/>
+                        <a:t>Maybe in a few unusual circumstances.</a:t>
+                      </a:r>
+                    </a:p>
+                  </a:txBody>
+                  <a:tcPr/>
+                </a:tc>
+                <a:extLst>
+                  <a:ext uri="{0D108BD9-81ED-4DB2-BD59-A6C34878D82A}">
+                    <a16:rowId xmlns:a16="http://schemas.microsoft.com/office/drawing/2014/main" val="124628567"/>
+                  </a:ext>
+                </a:extLst>
+              </a:tr>
+              <a:tr h="370840">
+                <a:tc>
+                  <a:txBody>
+                    <a:bodyPr/>
+                    <a:lstStyle/>
+                    <a:p>
+                      <a:r>
+                        <a:rPr lang="en-US" sz="1400" baseline="0" dirty="0"/>
+                        <a:t>Useful to do ternary or LPM matching?</a:t>
+                      </a:r>
+                    </a:p>
+                  </a:txBody>
+                  <a:tcPr/>
+                </a:tc>
+                <a:tc>
+                  <a:txBody>
+                    <a:bodyPr/>
+                    <a:lstStyle/>
+                    <a:p>
+                      <a:r>
+                        <a:rPr lang="en-US" sz="1400" baseline="0" dirty="0"/>
+                        <a:t>Yes</a:t>
+                      </a:r>
+                    </a:p>
+                  </a:txBody>
+                  <a:tcPr/>
+                </a:tc>
+                <a:tc>
+                  <a:txBody>
+                    <a:bodyPr/>
+                    <a:lstStyle/>
+                    <a:p>
+                      <a:r>
+                        <a:rPr lang="en-US" sz="1400" baseline="0" dirty="0"/>
+                        <a:t>Maybe, e.g. ternary on </a:t>
+                      </a:r>
+                      <a:r>
+                        <a:rPr lang="en-US" sz="1400" baseline="0" dirty="0" err="1"/>
+                        <a:t>PacketLength_t</a:t>
+                      </a:r>
+                      <a:r>
+                        <a:rPr lang="en-US" sz="1400" baseline="0" dirty="0"/>
+                        <a:t> could be used for packet length ranges.</a:t>
+                      </a:r>
+                    </a:p>
+                  </a:txBody>
+                  <a:tcPr/>
+                </a:tc>
+                <a:tc>
+                  <a:txBody>
+                    <a:bodyPr/>
+                    <a:lstStyle/>
+                    <a:p>
+                      <a:r>
+                        <a:rPr lang="en-US" sz="1400" baseline="0" dirty="0"/>
+                        <a:t>Maybe for </a:t>
+                      </a:r>
+                      <a:r>
+                        <a:rPr lang="en-US" sz="1400" baseline="0" dirty="0" err="1"/>
+                        <a:t>Timestamp_t</a:t>
+                      </a:r>
+                      <a:r>
+                        <a:rPr lang="en-US" sz="1400" baseline="0" dirty="0"/>
+                        <a:t>, where numerical translation is “linear”.  Seems unlikely for </a:t>
+                      </a:r>
+                      <a:r>
+                        <a:rPr lang="en-US" sz="1400" baseline="0" dirty="0" err="1"/>
+                        <a:t>PortId_t</a:t>
+                      </a:r>
+                      <a:r>
+                        <a:rPr lang="en-US" sz="1400" baseline="0" dirty="0"/>
+                        <a:t> or </a:t>
+                      </a:r>
+                      <a:r>
+                        <a:rPr lang="en-US" sz="1400" baseline="0" dirty="0" err="1"/>
+                        <a:t>ClassOfService_t</a:t>
+                      </a:r>
+                      <a:r>
+                        <a:rPr lang="en-US" sz="1400" baseline="0" dirty="0"/>
+                        <a:t> where translation is arbitrary.</a:t>
+                      </a:r>
+                    </a:p>
+                  </a:txBody>
+                  <a:tcPr/>
+                </a:tc>
+                <a:extLst>
+                  <a:ext uri="{0D108BD9-81ED-4DB2-BD59-A6C34878D82A}">
+                    <a16:rowId xmlns:a16="http://schemas.microsoft.com/office/drawing/2014/main" val="2393019541"/>
+                  </a:ext>
+                </a:extLst>
+              </a:tr>
+            </a:tbl>
+          </a:graphicData>
+        </a:graphic>
+      </p:graphicFrame>
+    </p:spTree>
+    <p:extLst>
+      <p:ext uri="{BB962C8B-B14F-4D97-AF65-F5344CB8AC3E}">
+        <p14:creationId xmlns:p14="http://schemas.microsoft.com/office/powerpoint/2010/main" val="2459708104"/>
+      </p:ext>
+    </p:extLst>
+  </p:cSld>
+  <p:clrMapOvr>
+    <a:masterClrMapping/>
+  </p:clrMapOvr>
+</p:sld>
+</file>
+
+<file path=ppt/slides/slide18.xml><?xml version="1.0" encoding="utf-8"?>
+<p:sld xmlns:a="http://schemas.openxmlformats.org/drawingml/2006/main" xmlns:r="http://schemas.openxmlformats.org/officeDocument/2006/relationships" xmlns:p="http://schemas.openxmlformats.org/presentationml/2006/main">
+  <p:cSld>
+    <p:spTree>
+      <p:nvGrpSpPr>
+        <p:cNvPr id="1" name=""/>
+        <p:cNvGrpSpPr/>
+        <p:nvPr/>
+      </p:nvGrpSpPr>
+      <p:grpSpPr>
+        <a:xfrm>
+          <a:off x="0" y="0"/>
+          <a:ext cx="0" cy="0"/>
+          <a:chOff x="0" y="0"/>
+          <a:chExt cx="0" cy="0"/>
+        </a:xfrm>
+      </p:grpSpPr>
+      <p:sp>
+        <p:nvSpPr>
+          <p:cNvPr id="2" name="Title 1">
+            <a:extLst>
+              <a:ext uri="{FF2B5EF4-FFF2-40B4-BE49-F238E27FC236}">
+                <a16:creationId xmlns:a16="http://schemas.microsoft.com/office/drawing/2014/main" id="{A38247DC-C688-C74F-B8A7-3BD6A2307379}"/>
+              </a:ext>
+            </a:extLst>
+          </p:cNvPr>
+          <p:cNvSpPr>
+            <a:spLocks noGrp="1"/>
+          </p:cNvSpPr>
+          <p:nvPr>
+            <p:ph type="title"/>
+          </p:nvPr>
+        </p:nvSpPr>
+        <p:spPr/>
+        <p:txBody>
+          <a:bodyPr/>
+          <a:lstStyle/>
+          <a:p>
+            <a:r>
+              <a:rPr lang="en-US" dirty="0"/>
+              <a:t>Planned approach for control plane types</a:t>
+            </a:r>
+          </a:p>
+        </p:txBody>
+      </p:sp>
+      <p:sp>
+        <p:nvSpPr>
+          <p:cNvPr id="3" name="Content Placeholder 2">
+            <a:extLst>
+              <a:ext uri="{FF2B5EF4-FFF2-40B4-BE49-F238E27FC236}">
+                <a16:creationId xmlns:a16="http://schemas.microsoft.com/office/drawing/2014/main" id="{4EC228C1-19F8-D545-96F4-035D2C2D14CA}"/>
+              </a:ext>
+            </a:extLst>
+          </p:cNvPr>
+          <p:cNvSpPr>
+            <a:spLocks noGrp="1"/>
+          </p:cNvSpPr>
+          <p:nvPr>
+            <p:ph idx="1"/>
+          </p:nvPr>
+        </p:nvSpPr>
+        <p:spPr/>
+        <p:txBody>
+          <a:bodyPr>
+            <a:normAutofit fontScale="92500" lnSpcReduction="10000"/>
+          </a:bodyPr>
+          <a:lstStyle/>
+          <a:p>
+            <a:r>
+              <a:rPr lang="en-US" dirty="0"/>
+              <a:t>Add ‘type’ to P4_16 language specification:</a:t>
+            </a:r>
+          </a:p>
+          <a:p>
+            <a:pPr lvl="1"/>
+            <a:r>
+              <a:rPr lang="en-US" dirty="0"/>
+              <a:t>e.g. ‘</a:t>
+            </a:r>
+            <a:r>
+              <a:rPr lang="en-US" b="1" dirty="0"/>
+              <a:t>type bit&lt;7&gt; </a:t>
+            </a:r>
+            <a:r>
+              <a:rPr lang="en-US" b="1" dirty="0" err="1"/>
+              <a:t>PortId_t</a:t>
+            </a:r>
+            <a:r>
+              <a:rPr lang="en-US" b="1" dirty="0"/>
+              <a:t>;</a:t>
+            </a:r>
+            <a:r>
+              <a:rPr lang="en-US" dirty="0"/>
+              <a:t>’ creates a new type that is </a:t>
+            </a:r>
+            <a:r>
+              <a:rPr lang="en-US" u="sng" dirty="0"/>
+              <a:t>like</a:t>
+            </a:r>
+            <a:r>
+              <a:rPr lang="en-US" dirty="0"/>
+              <a:t> </a:t>
+            </a:r>
+            <a:r>
+              <a:rPr lang="en-US" b="1" dirty="0"/>
+              <a:t>bit&lt;7&gt;</a:t>
+            </a:r>
+            <a:r>
+              <a:rPr lang="en-US" dirty="0"/>
+              <a:t>, but </a:t>
+            </a:r>
+            <a:r>
+              <a:rPr lang="en-US" u="sng" dirty="0"/>
+              <a:t>not the same type</a:t>
+            </a:r>
+            <a:r>
+              <a:rPr lang="en-US" dirty="0"/>
+              <a:t> as </a:t>
+            </a:r>
+            <a:r>
+              <a:rPr lang="en-US" b="1" dirty="0"/>
+              <a:t>bit&lt;7&gt;</a:t>
+            </a:r>
+          </a:p>
+          <a:p>
+            <a:pPr lvl="1"/>
+            <a:r>
+              <a:rPr lang="en-US" dirty="0"/>
+              <a:t>You can do arithmetic operations on two </a:t>
+            </a:r>
+            <a:r>
+              <a:rPr lang="en-US" dirty="0" err="1"/>
+              <a:t>PortId_t</a:t>
+            </a:r>
+            <a:r>
+              <a:rPr lang="en-US" dirty="0"/>
+              <a:t> values without needing casts, e.g. </a:t>
+            </a:r>
+            <a:r>
+              <a:rPr lang="en-US" b="1" dirty="0"/>
+              <a:t>(port1 + port2)</a:t>
+            </a:r>
+            <a:endParaRPr lang="en-US" dirty="0"/>
+          </a:p>
+          <a:p>
+            <a:pPr lvl="2"/>
+            <a:r>
+              <a:rPr lang="en-US" dirty="0"/>
+              <a:t>TBD: Some might wish for P4 compiler to warn if you do arithmetic operations on PSA types that have numerical translation like </a:t>
+            </a:r>
+            <a:r>
+              <a:rPr lang="en-US" dirty="0" err="1"/>
+              <a:t>PortId_t</a:t>
+            </a:r>
+            <a:r>
+              <a:rPr lang="en-US" dirty="0"/>
+              <a:t> and </a:t>
+            </a:r>
+            <a:r>
+              <a:rPr lang="en-US" dirty="0" err="1"/>
+              <a:t>ClassOfService_t</a:t>
+            </a:r>
+            <a:r>
+              <a:rPr lang="en-US" dirty="0"/>
+              <a:t>.</a:t>
+            </a:r>
+          </a:p>
+          <a:p>
+            <a:pPr lvl="1"/>
+            <a:r>
+              <a:rPr lang="en-US" dirty="0"/>
+              <a:t>If you find a need for it, you can cast between </a:t>
+            </a:r>
+            <a:r>
+              <a:rPr lang="en-US" b="1" dirty="0" err="1"/>
+              <a:t>PortId_t</a:t>
+            </a:r>
+            <a:r>
+              <a:rPr lang="en-US" dirty="0"/>
+              <a:t> and </a:t>
+            </a:r>
+            <a:r>
+              <a:rPr lang="en-US" b="1" dirty="0" err="1"/>
+              <a:t>PortIdBitVector_t</a:t>
+            </a:r>
+            <a:r>
+              <a:rPr lang="en-US" dirty="0"/>
+              <a:t>, where </a:t>
+            </a:r>
+            <a:r>
+              <a:rPr lang="en-US" b="1" dirty="0" err="1"/>
+              <a:t>PortIdBitVector_t</a:t>
+            </a:r>
+            <a:r>
+              <a:rPr lang="en-US" dirty="0"/>
+              <a:t> </a:t>
+            </a:r>
+            <a:r>
+              <a:rPr lang="en-US" u="sng" dirty="0"/>
+              <a:t>is</a:t>
+            </a:r>
+            <a:r>
+              <a:rPr lang="en-US" dirty="0"/>
+              <a:t> </a:t>
+            </a:r>
+            <a:r>
+              <a:rPr lang="en-US" b="1" dirty="0"/>
+              <a:t>bit&lt;7&gt;</a:t>
+            </a:r>
+            <a:r>
+              <a:rPr lang="en-US" dirty="0"/>
+              <a:t>, defined as ‘</a:t>
+            </a:r>
+            <a:r>
+              <a:rPr lang="en-US" b="1" dirty="0" err="1"/>
+              <a:t>typedef</a:t>
+            </a:r>
+            <a:r>
+              <a:rPr lang="en-US" b="1" dirty="0"/>
+              <a:t> bit&lt;7&gt; </a:t>
+            </a:r>
+            <a:r>
+              <a:rPr lang="en-US" b="1" dirty="0" err="1"/>
+              <a:t>PortIdBitVector_t</a:t>
+            </a:r>
+            <a:r>
+              <a:rPr lang="en-US" b="1" dirty="0"/>
+              <a:t>;</a:t>
+            </a:r>
+            <a:r>
+              <a:rPr lang="en-US" dirty="0"/>
+              <a:t>’ in psa.p4.</a:t>
+            </a:r>
+          </a:p>
+          <a:p>
+            <a:r>
+              <a:rPr lang="en-US" dirty="0"/>
+              <a:t>PSA will contain definitions like this for each of 7 types:</a:t>
+            </a:r>
+          </a:p>
+          <a:p>
+            <a:pPr lvl="1"/>
+            <a:r>
+              <a:rPr lang="en-US" dirty="0"/>
+              <a:t>type bit&lt;7&gt; </a:t>
+            </a:r>
+            <a:r>
+              <a:rPr lang="en-US" dirty="0" err="1"/>
+              <a:t>PortId_t</a:t>
+            </a:r>
+            <a:r>
+              <a:rPr lang="en-US" dirty="0"/>
+              <a:t>;       // This will be used most often</a:t>
+            </a:r>
+          </a:p>
+          <a:p>
+            <a:pPr lvl="1"/>
+            <a:r>
+              <a:rPr lang="en-US" dirty="0" err="1"/>
+              <a:t>typedef</a:t>
+            </a:r>
+            <a:r>
+              <a:rPr lang="en-US" dirty="0"/>
+              <a:t> bit&lt;7&gt; </a:t>
+            </a:r>
+            <a:r>
+              <a:rPr lang="en-US" dirty="0" err="1"/>
+              <a:t>PortIdBitVector_t</a:t>
+            </a:r>
+            <a:r>
+              <a:rPr lang="en-US" dirty="0"/>
+              <a:t>;       // only if you want to cast to a bit&lt;7&gt;</a:t>
+            </a:r>
+          </a:p>
+          <a:p>
+            <a:pPr lvl="1"/>
+            <a:r>
+              <a:rPr lang="en-US" dirty="0" err="1"/>
+              <a:t>typedef</a:t>
+            </a:r>
+            <a:r>
+              <a:rPr lang="en-US" dirty="0"/>
+              <a:t> bit&lt;32&gt; </a:t>
+            </a:r>
+            <a:r>
+              <a:rPr lang="en-US" dirty="0" err="1"/>
+              <a:t>PortIdInHeader_t</a:t>
+            </a:r>
+            <a:r>
+              <a:rPr lang="en-US" dirty="0"/>
+              <a:t>;     // for headers to/from agent on PSA CPU port</a:t>
+            </a:r>
+          </a:p>
+        </p:txBody>
+      </p:sp>
+    </p:spTree>
+    <p:extLst>
+      <p:ext uri="{BB962C8B-B14F-4D97-AF65-F5344CB8AC3E}">
+        <p14:creationId xmlns:p14="http://schemas.microsoft.com/office/powerpoint/2010/main" val="1106856503"/>
+      </p:ext>
+    </p:extLst>
+  </p:cSld>
+  <p:clrMapOvr>
+    <a:masterClrMapping/>
+  </p:clrMapOvr>
+</p:sld>
+</file>
+
+<file path=ppt/slides/slide19.xml><?xml version="1.0" encoding="utf-8"?>
+<p:sld xmlns:a="http://schemas.openxmlformats.org/drawingml/2006/main" xmlns:r="http://schemas.openxmlformats.org/officeDocument/2006/relationships" xmlns:p="http://schemas.openxmlformats.org/presentationml/2006/main">
+  <p:cSld>
+    <p:spTree>
+      <p:nvGrpSpPr>
+        <p:cNvPr id="1" name=""/>
+        <p:cNvGrpSpPr/>
+        <p:nvPr/>
+      </p:nvGrpSpPr>
+      <p:grpSpPr>
+        <a:xfrm>
+          <a:off x="0" y="0"/>
+          <a:ext cx="0" cy="0"/>
+          <a:chOff x="0" y="0"/>
+          <a:chExt cx="0" cy="0"/>
+        </a:xfrm>
+      </p:grpSpPr>
+      <p:sp>
+        <p:nvSpPr>
+          <p:cNvPr id="2" name="Title 1">
+            <a:extLst>
+              <a:ext uri="{FF2B5EF4-FFF2-40B4-BE49-F238E27FC236}">
+                <a16:creationId xmlns:a16="http://schemas.microsoft.com/office/drawing/2014/main" id="{A38247DC-C688-C74F-B8A7-3BD6A2307379}"/>
+              </a:ext>
+            </a:extLst>
+          </p:cNvPr>
+          <p:cNvSpPr>
+            <a:spLocks noGrp="1"/>
+          </p:cNvSpPr>
+          <p:nvPr>
+            <p:ph type="title"/>
+          </p:nvPr>
+        </p:nvSpPr>
+        <p:spPr/>
+        <p:txBody>
+          <a:bodyPr/>
+          <a:lstStyle/>
+          <a:p>
+            <a:r>
+              <a:rPr lang="en-US" dirty="0"/>
+              <a:t>Planned approach for control plane types (#2)</a:t>
+            </a:r>
+          </a:p>
+        </p:txBody>
+      </p:sp>
+      <p:sp>
+        <p:nvSpPr>
+          <p:cNvPr id="3" name="Content Placeholder 2">
+            <a:extLst>
+              <a:ext uri="{FF2B5EF4-FFF2-40B4-BE49-F238E27FC236}">
+                <a16:creationId xmlns:a16="http://schemas.microsoft.com/office/drawing/2014/main" id="{4EC228C1-19F8-D545-96F4-035D2C2D14CA}"/>
+              </a:ext>
+            </a:extLst>
+          </p:cNvPr>
+          <p:cNvSpPr>
+            <a:spLocks noGrp="1"/>
+          </p:cNvSpPr>
+          <p:nvPr>
+            <p:ph idx="1"/>
+          </p:nvPr>
+        </p:nvSpPr>
+        <p:spPr/>
+        <p:txBody>
+          <a:bodyPr>
+            <a:normAutofit/>
+          </a:bodyPr>
+          <a:lstStyle/>
+          <a:p>
+            <a:r>
+              <a:rPr lang="en-US" dirty="0"/>
+              <a:t>P4 compiler will preserve type name ‘</a:t>
+            </a:r>
+            <a:r>
+              <a:rPr lang="en-US" dirty="0" err="1"/>
+              <a:t>PortId_t</a:t>
+            </a:r>
+            <a:r>
+              <a:rPr lang="en-US" dirty="0"/>
+              <a:t>’ from source code when generating P4Info files, when used as:</a:t>
+            </a:r>
+          </a:p>
+          <a:p>
+            <a:pPr lvl="1"/>
+            <a:r>
+              <a:rPr lang="en-US" dirty="0"/>
+              <a:t>Table key field</a:t>
+            </a:r>
+          </a:p>
+          <a:p>
+            <a:pPr lvl="1"/>
+            <a:r>
+              <a:rPr lang="en-US" dirty="0"/>
+              <a:t>Action parameter</a:t>
+            </a:r>
+          </a:p>
+          <a:p>
+            <a:pPr lvl="1"/>
+            <a:r>
+              <a:rPr lang="en-US" dirty="0"/>
+              <a:t>Field of </a:t>
+            </a:r>
+            <a:r>
+              <a:rPr lang="en-US" dirty="0" err="1"/>
+              <a:t>struct</a:t>
+            </a:r>
+            <a:r>
+              <a:rPr lang="en-US" dirty="0"/>
+              <a:t> for Digest or Register extern</a:t>
+            </a:r>
+          </a:p>
+          <a:p>
+            <a:pPr lvl="1"/>
+            <a:r>
+              <a:rPr lang="en-US" dirty="0"/>
+              <a:t>Perhaps other places I am forgetting right now</a:t>
+            </a:r>
+          </a:p>
+          <a:p>
+            <a:r>
+              <a:rPr lang="en-US" dirty="0"/>
+              <a:t>These 7 type names will be ‘special’ for the PSA architecture.</a:t>
+            </a:r>
+          </a:p>
+          <a:p>
+            <a:pPr lvl="1"/>
+            <a:r>
+              <a:rPr lang="en-US" dirty="0"/>
+              <a:t>They can be used for different or similar purposes in other </a:t>
+            </a:r>
+            <a:r>
+              <a:rPr lang="en-US"/>
+              <a:t>P4_16 architectures.</a:t>
+            </a:r>
+            <a:endParaRPr lang="en-US" dirty="0"/>
+          </a:p>
+        </p:txBody>
+      </p:sp>
+    </p:spTree>
+    <p:extLst>
+      <p:ext uri="{BB962C8B-B14F-4D97-AF65-F5344CB8AC3E}">
+        <p14:creationId xmlns:p14="http://schemas.microsoft.com/office/powerpoint/2010/main" val="62010619"/>
       </p:ext>
     </p:extLst>
   </p:cSld>
@@ -5004,11 +6174,11 @@
             </a:r>
             <a:r>
               <a:rPr lang="en-US" u="sng" dirty="0"/>
-              <a:t>should</a:t>
-            </a:r>
-            <a:r>
-              <a:rPr lang="en-US" dirty="0"/>
-              <a:t> know data plane has 17-bit width, to know legal range of values possible.</a:t>
+              <a:t>needs to know</a:t>
+            </a:r>
+            <a:r>
+              <a:rPr lang="en-US" dirty="0"/>
+              <a:t> the data plane has 17-bit width, to know legal range of values possible.</a:t>
             </a:r>
           </a:p>
           <a:p>
@@ -6073,7 +7243,7 @@
           <a:p>
             <a:r>
               <a:rPr lang="en-US" dirty="0"/>
-              <a:t>Agent handles these?</a:t>
+              <a:t>Agent also handles these</a:t>
             </a:r>
           </a:p>
           <a:p>
@@ -6110,7 +7280,29 @@
             <a:pPr lvl="1"/>
             <a:r>
               <a:rPr lang="en-US" dirty="0"/>
-              <a:t>If yes, agent can do translation of header fields, but may be considered too limiting on packet rates supported.</a:t>
+              <a:t>These packets traverse the same </a:t>
+            </a:r>
+            <a:r>
+              <a:rPr lang="en-US" dirty="0" err="1"/>
+              <a:t>gRPC</a:t>
+            </a:r>
+            <a:r>
+              <a:rPr lang="en-US" dirty="0"/>
+              <a:t> session between controller and agent that other P4Runtime messages do.</a:t>
+            </a:r>
+          </a:p>
+          <a:p>
+            <a:pPr lvl="1"/>
+            <a:r>
+              <a:rPr lang="en-US" dirty="0"/>
+              <a:t>Thus agent can do translation of header fields.</a:t>
+            </a:r>
+          </a:p>
+          <a:p>
+            <a:pPr lvl="1"/>
+            <a:r>
+              <a:rPr lang="en-US" dirty="0"/>
+              <a:t>See next slide for a different packet case.</a:t>
             </a:r>
           </a:p>
         </p:txBody>
@@ -7019,7 +8211,7 @@
         </p:spPr>
         <p:txBody>
           <a:bodyPr>
-            <a:normAutofit fontScale="92500" lnSpcReduction="20000"/>
+            <a:normAutofit fontScale="70000" lnSpcReduction="20000"/>
           </a:bodyPr>
           <a:lstStyle/>
           <a:p>
@@ -7063,8 +8255,67 @@
           <a:p>
             <a:r>
               <a:rPr lang="en-US" dirty="0"/>
-              <a:t>Agents do not handle direct data plane to data plane packets</a:t>
-            </a:r>
+              <a:t>Agents do </a:t>
+            </a:r>
+            <a:r>
+              <a:rPr lang="en-US" u="sng" dirty="0"/>
+              <a:t>not</a:t>
+            </a:r>
+            <a:r>
+              <a:rPr lang="en-US" dirty="0"/>
+              <a:t> handle direct data plane to data plane packets</a:t>
+            </a:r>
+          </a:p>
+          <a:p>
+            <a:pPr lvl="1"/>
+            <a:r>
+              <a:rPr lang="en-US" dirty="0"/>
+              <a:t>This includes any packets between targets and controller that do not go through P4Runtime </a:t>
+            </a:r>
+            <a:r>
+              <a:rPr lang="en-US" dirty="0" err="1"/>
+              <a:t>PacketIn</a:t>
+            </a:r>
+            <a:r>
+              <a:rPr lang="en-US" dirty="0"/>
+              <a:t> / </a:t>
+            </a:r>
+            <a:r>
+              <a:rPr lang="en-US" dirty="0" err="1"/>
+              <a:t>PacketOut</a:t>
+            </a:r>
+            <a:r>
+              <a:rPr lang="en-US" dirty="0"/>
+              <a:t> service.</a:t>
+            </a:r>
+          </a:p>
+          <a:p>
+            <a:pPr lvl="1"/>
+            <a:r>
+              <a:rPr lang="en-US" dirty="0"/>
+              <a:t>P4Runtime and PSA do not </a:t>
+            </a:r>
+            <a:r>
+              <a:rPr lang="en-US" u="sng" dirty="0"/>
+              <a:t>prevent</a:t>
+            </a:r>
+            <a:r>
+              <a:rPr lang="en-US" dirty="0"/>
+              <a:t> you from transmitting packets in this way – they just do not (in v1.0) define a way to do numerical translation of </a:t>
+            </a:r>
+            <a:r>
+              <a:rPr lang="en-US" dirty="0" err="1"/>
+              <a:t>PortId_t</a:t>
+            </a:r>
+            <a:r>
+              <a:rPr lang="en-US" dirty="0"/>
+              <a:t> and other types.  Maybe v1.x will </a:t>
+            </a:r>
+            <a:r>
+              <a:rPr lang="en-US"/>
+              <a:t>do so.</a:t>
+            </a:r>
+            <a:endParaRPr lang="en-US" dirty="0"/>
           </a:p>
           <a:p>
             <a:r>

</xml_diff>